<commit_message>
Forgot one update to Module 3
I needed to show the syntax for nameof in the slide.
</commit_message>
<xml_diff>
--- a/Slides/MVA-What'sNewC#6-Module3.pptx
+++ b/Slides/MVA-What'sNewC#6-Module3.pptx
@@ -4691,11 +4691,7 @@
           <a:p>
             <a:r>
               <a:rPr lang="en-US" dirty="0" smtClean="0"/>
-              <a:t>Meet Anthony D. Green </a:t>
-            </a:r>
-            <a:r>
-              <a:rPr lang="en-US" dirty="0" smtClean="0"/>
-              <a:t>|</a:t>
+              <a:t>Meet Anthony D. Green |</a:t>
             </a:r>
             <a:endParaRPr lang="en-US" dirty="0"/>
           </a:p>
@@ -4982,7 +4978,7 @@
                 <a:gridCol w="11324908">
                   <a:extLst>
                     <a:ext uri="{9D8B030D-6E8A-4147-A177-3AD203B41FA5}">
-                      <a16:colId xmlns:a16="http://schemas.microsoft.com/office/drawing/2014/main" xmlns="" val="1253488153"/>
+                      <a16:colId xmlns="" xmlns:a16="http://schemas.microsoft.com/office/drawing/2014/main" val="1253488153"/>
                     </a:ext>
                   </a:extLst>
                 </a:gridCol>
@@ -5004,7 +5000,7 @@
                 </a:tc>
                 <a:extLst>
                   <a:ext uri="{0D108BD9-81ED-4DB2-BD59-A6C34878D82A}">
-                    <a16:rowId xmlns:a16="http://schemas.microsoft.com/office/drawing/2014/main" xmlns="" val="829859176"/>
+                    <a16:rowId xmlns="" xmlns:a16="http://schemas.microsoft.com/office/drawing/2014/main" val="829859176"/>
                   </a:ext>
                 </a:extLst>
               </a:tr>
@@ -5029,7 +5025,7 @@
                 </a:tc>
                 <a:extLst>
                   <a:ext uri="{0D108BD9-81ED-4DB2-BD59-A6C34878D82A}">
-                    <a16:rowId xmlns:a16="http://schemas.microsoft.com/office/drawing/2014/main" xmlns="" val="1946132611"/>
+                    <a16:rowId xmlns="" xmlns:a16="http://schemas.microsoft.com/office/drawing/2014/main" val="1946132611"/>
                   </a:ext>
                 </a:extLst>
               </a:tr>
@@ -5049,7 +5045,7 @@
                 </a:tc>
                 <a:extLst>
                   <a:ext uri="{0D108BD9-81ED-4DB2-BD59-A6C34878D82A}">
-                    <a16:rowId xmlns:a16="http://schemas.microsoft.com/office/drawing/2014/main" xmlns="" val="3204002662"/>
+                    <a16:rowId xmlns="" xmlns:a16="http://schemas.microsoft.com/office/drawing/2014/main" val="3204002662"/>
                   </a:ext>
                 </a:extLst>
               </a:tr>
@@ -5074,7 +5070,7 @@
                 </a:tc>
                 <a:extLst>
                   <a:ext uri="{0D108BD9-81ED-4DB2-BD59-A6C34878D82A}">
-                    <a16:rowId xmlns:a16="http://schemas.microsoft.com/office/drawing/2014/main" xmlns="" val="4266278162"/>
+                    <a16:rowId xmlns="" xmlns:a16="http://schemas.microsoft.com/office/drawing/2014/main" val="4266278162"/>
                   </a:ext>
                 </a:extLst>
               </a:tr>
@@ -5094,7 +5090,7 @@
                 </a:tc>
                 <a:extLst>
                   <a:ext uri="{0D108BD9-81ED-4DB2-BD59-A6C34878D82A}">
-                    <a16:rowId xmlns:a16="http://schemas.microsoft.com/office/drawing/2014/main" xmlns="" val="2975720638"/>
+                    <a16:rowId xmlns="" xmlns:a16="http://schemas.microsoft.com/office/drawing/2014/main" val="2975720638"/>
                   </a:ext>
                 </a:extLst>
               </a:tr>
@@ -5119,7 +5115,7 @@
                 </a:tc>
                 <a:extLst>
                   <a:ext uri="{0D108BD9-81ED-4DB2-BD59-A6C34878D82A}">
-                    <a16:rowId xmlns:a16="http://schemas.microsoft.com/office/drawing/2014/main" xmlns="" val="1816156953"/>
+                    <a16:rowId xmlns="" xmlns:a16="http://schemas.microsoft.com/office/drawing/2014/main" val="1816156953"/>
                   </a:ext>
                 </a:extLst>
               </a:tr>
@@ -5144,7 +5140,7 @@
                 </a:tc>
                 <a:extLst>
                   <a:ext uri="{0D108BD9-81ED-4DB2-BD59-A6C34878D82A}">
-                    <a16:rowId xmlns:a16="http://schemas.microsoft.com/office/drawing/2014/main" xmlns="" val="22492752"/>
+                    <a16:rowId xmlns="" xmlns:a16="http://schemas.microsoft.com/office/drawing/2014/main" val="22492752"/>
                   </a:ext>
                 </a:extLst>
               </a:tr>
@@ -6528,6 +6524,844 @@
           </a:p>
         </p:txBody>
       </p:sp>
+      <p:sp>
+        <p:nvSpPr>
+          <p:cNvPr id="7" name="Content Placeholder 5"/>
+          <p:cNvSpPr txBox="1">
+            <a:spLocks/>
+          </p:cNvSpPr>
+          <p:nvPr/>
+        </p:nvSpPr>
+        <p:spPr>
+          <a:xfrm>
+            <a:off x="589385" y="1733575"/>
+            <a:ext cx="6861282" cy="2465892"/>
+          </a:xfrm>
+          <a:prstGeom prst="rect">
+            <a:avLst/>
+          </a:prstGeom>
+        </p:spPr>
+        <p:txBody>
+          <a:bodyPr vert="horz" lIns="91440" tIns="45720" rIns="91440" bIns="45720" rtlCol="0">
+            <a:noAutofit/>
+          </a:bodyPr>
+          <a:lstStyle>
+            <a:lvl1pPr marL="274320" indent="-228600" algn="l" defTabSz="914400" rtl="0" eaLnBrk="1" latinLnBrk="0" hangingPunct="1">
+              <a:lnSpc>
+                <a:spcPct val="90000"/>
+              </a:lnSpc>
+              <a:spcBef>
+                <a:spcPts val="1800"/>
+              </a:spcBef>
+              <a:buClr>
+                <a:schemeClr val="tx1">
+                  <a:lumMod val="65000"/>
+                  <a:lumOff val="35000"/>
+                </a:schemeClr>
+              </a:buClr>
+              <a:buSzPct val="80000"/>
+              <a:buFont typeface="Arial" pitchFamily="34" charset="0"/>
+              <a:buChar char="•"/>
+              <a:defRPr sz="2000" kern="1200">
+                <a:solidFill>
+                  <a:schemeClr val="tx1">
+                    <a:lumMod val="65000"/>
+                    <a:lumOff val="35000"/>
+                  </a:schemeClr>
+                </a:solidFill>
+                <a:latin typeface="+mn-lt"/>
+                <a:ea typeface="+mn-ea"/>
+                <a:cs typeface="+mn-cs"/>
+              </a:defRPr>
+            </a:lvl1pPr>
+            <a:lvl2pPr marL="594360" indent="-228600" algn="l" defTabSz="914400" rtl="0" eaLnBrk="1" latinLnBrk="0" hangingPunct="1">
+              <a:lnSpc>
+                <a:spcPct val="90000"/>
+              </a:lnSpc>
+              <a:spcBef>
+                <a:spcPts val="1000"/>
+              </a:spcBef>
+              <a:buClr>
+                <a:schemeClr val="tx1">
+                  <a:lumMod val="65000"/>
+                  <a:lumOff val="35000"/>
+                </a:schemeClr>
+              </a:buClr>
+              <a:buSzPct val="80000"/>
+              <a:buFont typeface="Arial" pitchFamily="34" charset="0"/>
+              <a:buChar char="•"/>
+              <a:defRPr sz="1800" kern="1200">
+                <a:solidFill>
+                  <a:schemeClr val="tx1">
+                    <a:lumMod val="65000"/>
+                    <a:lumOff val="35000"/>
+                  </a:schemeClr>
+                </a:solidFill>
+                <a:latin typeface="+mn-lt"/>
+                <a:ea typeface="+mn-ea"/>
+                <a:cs typeface="+mn-cs"/>
+              </a:defRPr>
+            </a:lvl2pPr>
+            <a:lvl3pPr marL="777240" indent="-182880" algn="l" defTabSz="914400" rtl="0" eaLnBrk="1" latinLnBrk="0" hangingPunct="1">
+              <a:lnSpc>
+                <a:spcPct val="90000"/>
+              </a:lnSpc>
+              <a:spcBef>
+                <a:spcPts val="600"/>
+              </a:spcBef>
+              <a:buClr>
+                <a:schemeClr val="tx1">
+                  <a:lumMod val="65000"/>
+                  <a:lumOff val="35000"/>
+                </a:schemeClr>
+              </a:buClr>
+              <a:buSzPct val="80000"/>
+              <a:buFont typeface="Arial" pitchFamily="34" charset="0"/>
+              <a:buChar char="•"/>
+              <a:defRPr sz="1600" kern="1200">
+                <a:solidFill>
+                  <a:schemeClr val="tx1">
+                    <a:lumMod val="65000"/>
+                    <a:lumOff val="35000"/>
+                  </a:schemeClr>
+                </a:solidFill>
+                <a:latin typeface="+mn-lt"/>
+                <a:ea typeface="+mn-ea"/>
+                <a:cs typeface="+mn-cs"/>
+              </a:defRPr>
+            </a:lvl3pPr>
+            <a:lvl4pPr marL="960120" indent="-182880" algn="l" defTabSz="914400" rtl="0" eaLnBrk="1" latinLnBrk="0" hangingPunct="1">
+              <a:lnSpc>
+                <a:spcPct val="90000"/>
+              </a:lnSpc>
+              <a:spcBef>
+                <a:spcPts val="600"/>
+              </a:spcBef>
+              <a:buClr>
+                <a:schemeClr val="tx1">
+                  <a:lumMod val="65000"/>
+                  <a:lumOff val="35000"/>
+                </a:schemeClr>
+              </a:buClr>
+              <a:buSzPct val="80000"/>
+              <a:buFont typeface="Arial" pitchFamily="34" charset="0"/>
+              <a:buChar char="•"/>
+              <a:defRPr sz="1400" kern="1200">
+                <a:solidFill>
+                  <a:schemeClr val="tx1">
+                    <a:lumMod val="65000"/>
+                    <a:lumOff val="35000"/>
+                  </a:schemeClr>
+                </a:solidFill>
+                <a:latin typeface="+mn-lt"/>
+                <a:ea typeface="+mn-ea"/>
+                <a:cs typeface="+mn-cs"/>
+              </a:defRPr>
+            </a:lvl4pPr>
+            <a:lvl5pPr marL="1097280" indent="-137160" algn="l" defTabSz="914400" rtl="0" eaLnBrk="1" latinLnBrk="0" hangingPunct="1">
+              <a:lnSpc>
+                <a:spcPct val="90000"/>
+              </a:lnSpc>
+              <a:spcBef>
+                <a:spcPts val="600"/>
+              </a:spcBef>
+              <a:buClr>
+                <a:schemeClr val="tx1">
+                  <a:lumMod val="65000"/>
+                  <a:lumOff val="35000"/>
+                </a:schemeClr>
+              </a:buClr>
+              <a:buSzPct val="80000"/>
+              <a:buFont typeface="Arial" pitchFamily="34" charset="0"/>
+              <a:buChar char="•"/>
+              <a:defRPr sz="1400" kern="1200">
+                <a:solidFill>
+                  <a:schemeClr val="tx1">
+                    <a:lumMod val="65000"/>
+                    <a:lumOff val="35000"/>
+                  </a:schemeClr>
+                </a:solidFill>
+                <a:latin typeface="+mn-lt"/>
+                <a:ea typeface="+mn-ea"/>
+                <a:cs typeface="+mn-cs"/>
+              </a:defRPr>
+            </a:lvl5pPr>
+            <a:lvl6pPr marL="1234440" indent="-137160" algn="l" defTabSz="914400" rtl="0" eaLnBrk="1" latinLnBrk="0" hangingPunct="1">
+              <a:spcBef>
+                <a:spcPts val="600"/>
+              </a:spcBef>
+              <a:buSzPct val="80000"/>
+              <a:buFont typeface="Arial" pitchFamily="34" charset="0"/>
+              <a:buChar char="•"/>
+              <a:defRPr sz="1400" kern="1200">
+                <a:solidFill>
+                  <a:schemeClr val="tx1">
+                    <a:lumMod val="65000"/>
+                    <a:lumOff val="35000"/>
+                  </a:schemeClr>
+                </a:solidFill>
+                <a:latin typeface="+mn-lt"/>
+                <a:ea typeface="+mn-ea"/>
+                <a:cs typeface="+mn-cs"/>
+              </a:defRPr>
+            </a:lvl6pPr>
+            <a:lvl7pPr marL="1371600" indent="-137160" algn="l" defTabSz="914400" rtl="0" eaLnBrk="1" latinLnBrk="0" hangingPunct="1">
+              <a:spcBef>
+                <a:spcPts val="600"/>
+              </a:spcBef>
+              <a:buSzPct val="80000"/>
+              <a:buFont typeface="Arial" pitchFamily="34" charset="0"/>
+              <a:buChar char="•"/>
+              <a:defRPr sz="1400" kern="1200">
+                <a:solidFill>
+                  <a:schemeClr val="tx1">
+                    <a:lumMod val="65000"/>
+                    <a:lumOff val="35000"/>
+                  </a:schemeClr>
+                </a:solidFill>
+                <a:latin typeface="+mn-lt"/>
+                <a:ea typeface="+mn-ea"/>
+                <a:cs typeface="+mn-cs"/>
+              </a:defRPr>
+            </a:lvl7pPr>
+            <a:lvl8pPr marL="1508760" indent="-137160" algn="l" defTabSz="914400" rtl="0" eaLnBrk="1" latinLnBrk="0" hangingPunct="1">
+              <a:spcBef>
+                <a:spcPts val="600"/>
+              </a:spcBef>
+              <a:buSzPct val="80000"/>
+              <a:buFont typeface="Arial" pitchFamily="34" charset="0"/>
+              <a:buChar char="•"/>
+              <a:defRPr sz="1400" kern="1200">
+                <a:solidFill>
+                  <a:schemeClr val="tx1">
+                    <a:lumMod val="65000"/>
+                    <a:lumOff val="35000"/>
+                  </a:schemeClr>
+                </a:solidFill>
+                <a:latin typeface="+mn-lt"/>
+                <a:ea typeface="+mn-ea"/>
+                <a:cs typeface="+mn-cs"/>
+              </a:defRPr>
+            </a:lvl8pPr>
+            <a:lvl9pPr marL="1645920" indent="-137160" algn="l" defTabSz="914400" rtl="0" eaLnBrk="1" latinLnBrk="0" hangingPunct="1">
+              <a:spcBef>
+                <a:spcPts val="600"/>
+              </a:spcBef>
+              <a:buSzPct val="80000"/>
+              <a:buFont typeface="Arial" pitchFamily="34" charset="0"/>
+              <a:buChar char="•"/>
+              <a:defRPr sz="1400" kern="1200">
+                <a:solidFill>
+                  <a:schemeClr val="tx1">
+                    <a:lumMod val="65000"/>
+                    <a:lumOff val="35000"/>
+                  </a:schemeClr>
+                </a:solidFill>
+                <a:latin typeface="+mn-lt"/>
+                <a:ea typeface="+mn-ea"/>
+                <a:cs typeface="+mn-cs"/>
+              </a:defRPr>
+            </a:lvl9pPr>
+          </a:lstStyle>
+          <a:p>
+            <a:pPr marL="0" marR="0">
+              <a:lnSpc>
+                <a:spcPct val="107000"/>
+              </a:lnSpc>
+              <a:spcBef>
+                <a:spcPts val="0"/>
+              </a:spcBef>
+              <a:spcAft>
+                <a:spcPts val="0"/>
+              </a:spcAft>
+            </a:pPr>
+            <a:r>
+              <a:rPr lang="en-US" sz="1600" dirty="0">
+                <a:solidFill>
+                  <a:srgbClr val="0000FF"/>
+                </a:solidFill>
+                <a:highlight>
+                  <a:srgbClr val="FFFFFF"/>
+                </a:highlight>
+                <a:latin typeface="Consolas" panose="020B0609020204030204" pitchFamily="49" charset="0"/>
+                <a:ea typeface="Calibri" panose="020F0502020204030204" pitchFamily="34" charset="0"/>
+                <a:cs typeface="Times New Roman" panose="02020603050405020304" pitchFamily="18" charset="0"/>
+              </a:rPr>
+              <a:t>if</a:t>
+            </a:r>
+            <a:r>
+              <a:rPr lang="en-US" sz="1600" dirty="0">
+                <a:solidFill>
+                  <a:srgbClr val="000000"/>
+                </a:solidFill>
+                <a:highlight>
+                  <a:srgbClr val="FFFFFF"/>
+                </a:highlight>
+                <a:latin typeface="Consolas" panose="020B0609020204030204" pitchFamily="49" charset="0"/>
+                <a:ea typeface="Calibri" panose="020F0502020204030204" pitchFamily="34" charset="0"/>
+                <a:cs typeface="Times New Roman" panose="02020603050405020304" pitchFamily="18" charset="0"/>
+              </a:rPr>
+              <a:t> (name == </a:t>
+            </a:r>
+            <a:r>
+              <a:rPr lang="en-US" sz="1600" dirty="0">
+                <a:solidFill>
+                  <a:srgbClr val="0000FF"/>
+                </a:solidFill>
+                <a:highlight>
+                  <a:srgbClr val="FFFFFF"/>
+                </a:highlight>
+                <a:latin typeface="Consolas" panose="020B0609020204030204" pitchFamily="49" charset="0"/>
+                <a:ea typeface="Calibri" panose="020F0502020204030204" pitchFamily="34" charset="0"/>
+                <a:cs typeface="Times New Roman" panose="02020603050405020304" pitchFamily="18" charset="0"/>
+              </a:rPr>
+              <a:t>null</a:t>
+            </a:r>
+            <a:r>
+              <a:rPr lang="en-US" sz="1600" dirty="0">
+                <a:solidFill>
+                  <a:srgbClr val="000000"/>
+                </a:solidFill>
+                <a:highlight>
+                  <a:srgbClr val="FFFFFF"/>
+                </a:highlight>
+                <a:latin typeface="Consolas" panose="020B0609020204030204" pitchFamily="49" charset="0"/>
+                <a:ea typeface="Calibri" panose="020F0502020204030204" pitchFamily="34" charset="0"/>
+                <a:cs typeface="Times New Roman" panose="02020603050405020304" pitchFamily="18" charset="0"/>
+              </a:rPr>
+              <a:t>)</a:t>
+            </a:r>
+            <a:endParaRPr lang="en-US" sz="1600" dirty="0">
+              <a:latin typeface="Calibri" panose="020F0502020204030204" pitchFamily="34" charset="0"/>
+              <a:ea typeface="Calibri" panose="020F0502020204030204" pitchFamily="34" charset="0"/>
+              <a:cs typeface="Times New Roman" panose="02020603050405020304" pitchFamily="18" charset="0"/>
+            </a:endParaRPr>
+          </a:p>
+          <a:p>
+            <a:pPr marL="0" marR="0">
+              <a:lnSpc>
+                <a:spcPct val="107000"/>
+              </a:lnSpc>
+              <a:spcBef>
+                <a:spcPts val="0"/>
+              </a:spcBef>
+              <a:spcAft>
+                <a:spcPts val="0"/>
+              </a:spcAft>
+            </a:pPr>
+            <a:r>
+              <a:rPr lang="en-US" sz="1600" dirty="0">
+                <a:solidFill>
+                  <a:srgbClr val="000000"/>
+                </a:solidFill>
+                <a:highlight>
+                  <a:srgbClr val="FFFFFF"/>
+                </a:highlight>
+                <a:latin typeface="Consolas" panose="020B0609020204030204" pitchFamily="49" charset="0"/>
+                <a:ea typeface="Calibri" panose="020F0502020204030204" pitchFamily="34" charset="0"/>
+                <a:cs typeface="Times New Roman" panose="02020603050405020304" pitchFamily="18" charset="0"/>
+              </a:rPr>
+              <a:t>    </a:t>
+            </a:r>
+            <a:r>
+              <a:rPr lang="en-US" sz="1600" dirty="0">
+                <a:solidFill>
+                  <a:srgbClr val="0000FF"/>
+                </a:solidFill>
+                <a:highlight>
+                  <a:srgbClr val="FFFFFF"/>
+                </a:highlight>
+                <a:latin typeface="Consolas" panose="020B0609020204030204" pitchFamily="49" charset="0"/>
+                <a:ea typeface="Calibri" panose="020F0502020204030204" pitchFamily="34" charset="0"/>
+                <a:cs typeface="Times New Roman" panose="02020603050405020304" pitchFamily="18" charset="0"/>
+              </a:rPr>
+              <a:t>throw</a:t>
+            </a:r>
+            <a:r>
+              <a:rPr lang="en-US" sz="1600" dirty="0">
+                <a:solidFill>
+                  <a:srgbClr val="000000"/>
+                </a:solidFill>
+                <a:highlight>
+                  <a:srgbClr val="FFFFFF"/>
+                </a:highlight>
+                <a:latin typeface="Consolas" panose="020B0609020204030204" pitchFamily="49" charset="0"/>
+                <a:ea typeface="Calibri" panose="020F0502020204030204" pitchFamily="34" charset="0"/>
+                <a:cs typeface="Times New Roman" panose="02020603050405020304" pitchFamily="18" charset="0"/>
+              </a:rPr>
+              <a:t> </a:t>
+            </a:r>
+            <a:r>
+              <a:rPr lang="en-US" sz="1600" dirty="0">
+                <a:solidFill>
+                  <a:srgbClr val="0000FF"/>
+                </a:solidFill>
+                <a:highlight>
+                  <a:srgbClr val="FFFFFF"/>
+                </a:highlight>
+                <a:latin typeface="Consolas" panose="020B0609020204030204" pitchFamily="49" charset="0"/>
+                <a:ea typeface="Calibri" panose="020F0502020204030204" pitchFamily="34" charset="0"/>
+                <a:cs typeface="Times New Roman" panose="02020603050405020304" pitchFamily="18" charset="0"/>
+              </a:rPr>
+              <a:t>new</a:t>
+            </a:r>
+            <a:r>
+              <a:rPr lang="en-US" sz="1600" dirty="0">
+                <a:solidFill>
+                  <a:srgbClr val="000000"/>
+                </a:solidFill>
+                <a:highlight>
+                  <a:srgbClr val="FFFFFF"/>
+                </a:highlight>
+                <a:latin typeface="Consolas" panose="020B0609020204030204" pitchFamily="49" charset="0"/>
+                <a:ea typeface="Calibri" panose="020F0502020204030204" pitchFamily="34" charset="0"/>
+                <a:cs typeface="Times New Roman" panose="02020603050405020304" pitchFamily="18" charset="0"/>
+              </a:rPr>
+              <a:t> </a:t>
+            </a:r>
+            <a:r>
+              <a:rPr lang="en-US" sz="1600" dirty="0" err="1">
+                <a:solidFill>
+                  <a:srgbClr val="2B91AF"/>
+                </a:solidFill>
+                <a:highlight>
+                  <a:srgbClr val="FFFFFF"/>
+                </a:highlight>
+                <a:latin typeface="Consolas" panose="020B0609020204030204" pitchFamily="49" charset="0"/>
+                <a:ea typeface="Calibri" panose="020F0502020204030204" pitchFamily="34" charset="0"/>
+                <a:cs typeface="Times New Roman" panose="02020603050405020304" pitchFamily="18" charset="0"/>
+              </a:rPr>
+              <a:t>ArgumentNullException</a:t>
+            </a:r>
+            <a:r>
+              <a:rPr lang="en-US" sz="1600" dirty="0">
+                <a:solidFill>
+                  <a:srgbClr val="000000"/>
+                </a:solidFill>
+                <a:highlight>
+                  <a:srgbClr val="FFFFFF"/>
+                </a:highlight>
+                <a:latin typeface="Consolas" panose="020B0609020204030204" pitchFamily="49" charset="0"/>
+                <a:ea typeface="Calibri" panose="020F0502020204030204" pitchFamily="34" charset="0"/>
+                <a:cs typeface="Times New Roman" panose="02020603050405020304" pitchFamily="18" charset="0"/>
+              </a:rPr>
+              <a:t>(</a:t>
+            </a:r>
+            <a:r>
+              <a:rPr lang="en-US" sz="1600" dirty="0" err="1">
+                <a:solidFill>
+                  <a:srgbClr val="0000FF"/>
+                </a:solidFill>
+                <a:highlight>
+                  <a:srgbClr val="FFFFFF"/>
+                </a:highlight>
+                <a:latin typeface="Consolas" panose="020B0609020204030204" pitchFamily="49" charset="0"/>
+                <a:ea typeface="Calibri" panose="020F0502020204030204" pitchFamily="34" charset="0"/>
+                <a:cs typeface="Times New Roman" panose="02020603050405020304" pitchFamily="18" charset="0"/>
+              </a:rPr>
+              <a:t>nameof</a:t>
+            </a:r>
+            <a:r>
+              <a:rPr lang="en-US" sz="1600" dirty="0">
+                <a:solidFill>
+                  <a:srgbClr val="000000"/>
+                </a:solidFill>
+                <a:highlight>
+                  <a:srgbClr val="FFFFFF"/>
+                </a:highlight>
+                <a:latin typeface="Consolas" panose="020B0609020204030204" pitchFamily="49" charset="0"/>
+                <a:ea typeface="Calibri" panose="020F0502020204030204" pitchFamily="34" charset="0"/>
+                <a:cs typeface="Times New Roman" panose="02020603050405020304" pitchFamily="18" charset="0"/>
+              </a:rPr>
+              <a:t>(name), </a:t>
+            </a:r>
+            <a:endParaRPr lang="en-US" sz="1600" dirty="0">
+              <a:latin typeface="Calibri" panose="020F0502020204030204" pitchFamily="34" charset="0"/>
+              <a:ea typeface="Calibri" panose="020F0502020204030204" pitchFamily="34" charset="0"/>
+              <a:cs typeface="Times New Roman" panose="02020603050405020304" pitchFamily="18" charset="0"/>
+            </a:endParaRPr>
+          </a:p>
+          <a:p>
+            <a:pPr marL="0" marR="0">
+              <a:lnSpc>
+                <a:spcPct val="107000"/>
+              </a:lnSpc>
+              <a:spcBef>
+                <a:spcPts val="0"/>
+              </a:spcBef>
+              <a:spcAft>
+                <a:spcPts val="0"/>
+              </a:spcAft>
+            </a:pPr>
+            <a:r>
+              <a:rPr lang="en-US" sz="1600" dirty="0">
+                <a:solidFill>
+                  <a:srgbClr val="000000"/>
+                </a:solidFill>
+                <a:highlight>
+                  <a:srgbClr val="FFFFFF"/>
+                </a:highlight>
+                <a:latin typeface="Consolas" panose="020B0609020204030204" pitchFamily="49" charset="0"/>
+                <a:ea typeface="Calibri" panose="020F0502020204030204" pitchFamily="34" charset="0"/>
+                <a:cs typeface="Times New Roman" panose="02020603050405020304" pitchFamily="18" charset="0"/>
+              </a:rPr>
+              <a:t>        </a:t>
+            </a:r>
+            <a:r>
+              <a:rPr lang="en-US" sz="1600" dirty="0">
+                <a:solidFill>
+                  <a:srgbClr val="A31515"/>
+                </a:solidFill>
+                <a:highlight>
+                  <a:srgbClr val="FFFFFF"/>
+                </a:highlight>
+                <a:latin typeface="Consolas" panose="020B0609020204030204" pitchFamily="49" charset="0"/>
+                <a:ea typeface="Calibri" panose="020F0502020204030204" pitchFamily="34" charset="0"/>
+                <a:cs typeface="Times New Roman" panose="02020603050405020304" pitchFamily="18" charset="0"/>
+              </a:rPr>
+              <a:t>"The Evil Genius must have a name"</a:t>
+            </a:r>
+            <a:r>
+              <a:rPr lang="en-US" sz="1600" dirty="0">
+                <a:solidFill>
+                  <a:srgbClr val="000000"/>
+                </a:solidFill>
+                <a:highlight>
+                  <a:srgbClr val="FFFFFF"/>
+                </a:highlight>
+                <a:latin typeface="Consolas" panose="020B0609020204030204" pitchFamily="49" charset="0"/>
+                <a:ea typeface="Calibri" panose="020F0502020204030204" pitchFamily="34" charset="0"/>
+                <a:cs typeface="Times New Roman" panose="02020603050405020304" pitchFamily="18" charset="0"/>
+              </a:rPr>
+              <a:t>);</a:t>
+            </a:r>
+            <a:endParaRPr lang="en-US" sz="1600" dirty="0">
+              <a:latin typeface="Calibri" panose="020F0502020204030204" pitchFamily="34" charset="0"/>
+              <a:ea typeface="Calibri" panose="020F0502020204030204" pitchFamily="34" charset="0"/>
+              <a:cs typeface="Times New Roman" panose="02020603050405020304" pitchFamily="18" charset="0"/>
+            </a:endParaRPr>
+          </a:p>
+          <a:p>
+            <a:pPr marL="0" marR="0">
+              <a:lnSpc>
+                <a:spcPct val="107000"/>
+              </a:lnSpc>
+              <a:spcBef>
+                <a:spcPts val="0"/>
+              </a:spcBef>
+              <a:spcAft>
+                <a:spcPts val="0"/>
+              </a:spcAft>
+            </a:pPr>
+            <a:r>
+              <a:rPr lang="en-US" sz="1600" dirty="0">
+                <a:solidFill>
+                  <a:srgbClr val="0000FF"/>
+                </a:solidFill>
+                <a:highlight>
+                  <a:srgbClr val="FFFFFF"/>
+                </a:highlight>
+                <a:latin typeface="Consolas" panose="020B0609020204030204" pitchFamily="49" charset="0"/>
+                <a:ea typeface="Calibri" panose="020F0502020204030204" pitchFamily="34" charset="0"/>
+                <a:cs typeface="Times New Roman" panose="02020603050405020304" pitchFamily="18" charset="0"/>
+              </a:rPr>
+              <a:t>if</a:t>
+            </a:r>
+            <a:r>
+              <a:rPr lang="en-US" sz="1600" dirty="0">
+                <a:solidFill>
+                  <a:srgbClr val="000000"/>
+                </a:solidFill>
+                <a:highlight>
+                  <a:srgbClr val="FFFFFF"/>
+                </a:highlight>
+                <a:latin typeface="Consolas" panose="020B0609020204030204" pitchFamily="49" charset="0"/>
+                <a:ea typeface="Calibri" panose="020F0502020204030204" pitchFamily="34" charset="0"/>
+                <a:cs typeface="Times New Roman" panose="02020603050405020304" pitchFamily="18" charset="0"/>
+              </a:rPr>
+              <a:t> (</a:t>
+            </a:r>
+            <a:r>
+              <a:rPr lang="en-US" sz="1600" dirty="0" err="1">
+                <a:solidFill>
+                  <a:srgbClr val="0000FF"/>
+                </a:solidFill>
+                <a:highlight>
+                  <a:srgbClr val="FFFFFF"/>
+                </a:highlight>
+                <a:latin typeface="Consolas" panose="020B0609020204030204" pitchFamily="49" charset="0"/>
+                <a:ea typeface="Calibri" panose="020F0502020204030204" pitchFamily="34" charset="0"/>
+                <a:cs typeface="Times New Roman" panose="02020603050405020304" pitchFamily="18" charset="0"/>
+              </a:rPr>
+              <a:t>string</a:t>
+            </a:r>
+            <a:r>
+              <a:rPr lang="en-US" sz="1600" dirty="0" err="1">
+                <a:solidFill>
+                  <a:srgbClr val="000000"/>
+                </a:solidFill>
+                <a:highlight>
+                  <a:srgbClr val="FFFFFF"/>
+                </a:highlight>
+                <a:latin typeface="Consolas" panose="020B0609020204030204" pitchFamily="49" charset="0"/>
+                <a:ea typeface="Calibri" panose="020F0502020204030204" pitchFamily="34" charset="0"/>
+                <a:cs typeface="Times New Roman" panose="02020603050405020304" pitchFamily="18" charset="0"/>
+              </a:rPr>
+              <a:t>.IsNullOrWhiteSpace</a:t>
+            </a:r>
+            <a:r>
+              <a:rPr lang="en-US" sz="1600" dirty="0">
+                <a:solidFill>
+                  <a:srgbClr val="000000"/>
+                </a:solidFill>
+                <a:highlight>
+                  <a:srgbClr val="FFFFFF"/>
+                </a:highlight>
+                <a:latin typeface="Consolas" panose="020B0609020204030204" pitchFamily="49" charset="0"/>
+                <a:ea typeface="Calibri" panose="020F0502020204030204" pitchFamily="34" charset="0"/>
+                <a:cs typeface="Times New Roman" panose="02020603050405020304" pitchFamily="18" charset="0"/>
+              </a:rPr>
+              <a:t>(name))</a:t>
+            </a:r>
+            <a:endParaRPr lang="en-US" sz="1600" dirty="0">
+              <a:latin typeface="Calibri" panose="020F0502020204030204" pitchFamily="34" charset="0"/>
+              <a:ea typeface="Calibri" panose="020F0502020204030204" pitchFamily="34" charset="0"/>
+              <a:cs typeface="Times New Roman" panose="02020603050405020304" pitchFamily="18" charset="0"/>
+            </a:endParaRPr>
+          </a:p>
+          <a:p>
+            <a:pPr marL="0" marR="0">
+              <a:lnSpc>
+                <a:spcPct val="107000"/>
+              </a:lnSpc>
+              <a:spcBef>
+                <a:spcPts val="0"/>
+              </a:spcBef>
+              <a:spcAft>
+                <a:spcPts val="0"/>
+              </a:spcAft>
+            </a:pPr>
+            <a:r>
+              <a:rPr lang="en-US" sz="1600" dirty="0">
+                <a:solidFill>
+                  <a:srgbClr val="000000"/>
+                </a:solidFill>
+                <a:highlight>
+                  <a:srgbClr val="FFFFFF"/>
+                </a:highlight>
+                <a:latin typeface="Consolas" panose="020B0609020204030204" pitchFamily="49" charset="0"/>
+                <a:ea typeface="Calibri" panose="020F0502020204030204" pitchFamily="34" charset="0"/>
+                <a:cs typeface="Times New Roman" panose="02020603050405020304" pitchFamily="18" charset="0"/>
+              </a:rPr>
+              <a:t>    </a:t>
+            </a:r>
+            <a:r>
+              <a:rPr lang="en-US" sz="1600" dirty="0">
+                <a:solidFill>
+                  <a:srgbClr val="0000FF"/>
+                </a:solidFill>
+                <a:highlight>
+                  <a:srgbClr val="FFFFFF"/>
+                </a:highlight>
+                <a:latin typeface="Consolas" panose="020B0609020204030204" pitchFamily="49" charset="0"/>
+                <a:ea typeface="Calibri" panose="020F0502020204030204" pitchFamily="34" charset="0"/>
+                <a:cs typeface="Times New Roman" panose="02020603050405020304" pitchFamily="18" charset="0"/>
+              </a:rPr>
+              <a:t>throw</a:t>
+            </a:r>
+            <a:r>
+              <a:rPr lang="en-US" sz="1600" dirty="0">
+                <a:solidFill>
+                  <a:srgbClr val="000000"/>
+                </a:solidFill>
+                <a:highlight>
+                  <a:srgbClr val="FFFFFF"/>
+                </a:highlight>
+                <a:latin typeface="Consolas" panose="020B0609020204030204" pitchFamily="49" charset="0"/>
+                <a:ea typeface="Calibri" panose="020F0502020204030204" pitchFamily="34" charset="0"/>
+                <a:cs typeface="Times New Roman" panose="02020603050405020304" pitchFamily="18" charset="0"/>
+              </a:rPr>
+              <a:t> </a:t>
+            </a:r>
+            <a:r>
+              <a:rPr lang="en-US" sz="1600" dirty="0">
+                <a:solidFill>
+                  <a:srgbClr val="0000FF"/>
+                </a:solidFill>
+                <a:highlight>
+                  <a:srgbClr val="FFFFFF"/>
+                </a:highlight>
+                <a:latin typeface="Consolas" panose="020B0609020204030204" pitchFamily="49" charset="0"/>
+                <a:ea typeface="Calibri" panose="020F0502020204030204" pitchFamily="34" charset="0"/>
+                <a:cs typeface="Times New Roman" panose="02020603050405020304" pitchFamily="18" charset="0"/>
+              </a:rPr>
+              <a:t>new</a:t>
+            </a:r>
+            <a:r>
+              <a:rPr lang="en-US" sz="1600" dirty="0">
+                <a:solidFill>
+                  <a:srgbClr val="000000"/>
+                </a:solidFill>
+                <a:highlight>
+                  <a:srgbClr val="FFFFFF"/>
+                </a:highlight>
+                <a:latin typeface="Consolas" panose="020B0609020204030204" pitchFamily="49" charset="0"/>
+                <a:ea typeface="Calibri" panose="020F0502020204030204" pitchFamily="34" charset="0"/>
+                <a:cs typeface="Times New Roman" panose="02020603050405020304" pitchFamily="18" charset="0"/>
+              </a:rPr>
+              <a:t> </a:t>
+            </a:r>
+            <a:r>
+              <a:rPr lang="en-US" sz="1600" dirty="0" err="1">
+                <a:solidFill>
+                  <a:srgbClr val="2B91AF"/>
+                </a:solidFill>
+                <a:highlight>
+                  <a:srgbClr val="FFFFFF"/>
+                </a:highlight>
+                <a:latin typeface="Consolas" panose="020B0609020204030204" pitchFamily="49" charset="0"/>
+                <a:ea typeface="Calibri" panose="020F0502020204030204" pitchFamily="34" charset="0"/>
+                <a:cs typeface="Times New Roman" panose="02020603050405020304" pitchFamily="18" charset="0"/>
+              </a:rPr>
+              <a:t>ArgumentException</a:t>
+            </a:r>
+            <a:r>
+              <a:rPr lang="en-US" sz="1600" dirty="0">
+                <a:solidFill>
+                  <a:srgbClr val="000000"/>
+                </a:solidFill>
+                <a:highlight>
+                  <a:srgbClr val="FFFFFF"/>
+                </a:highlight>
+                <a:latin typeface="Consolas" panose="020B0609020204030204" pitchFamily="49" charset="0"/>
+                <a:ea typeface="Calibri" panose="020F0502020204030204" pitchFamily="34" charset="0"/>
+                <a:cs typeface="Times New Roman" panose="02020603050405020304" pitchFamily="18" charset="0"/>
+              </a:rPr>
+              <a:t>(</a:t>
+            </a:r>
+            <a:r>
+              <a:rPr lang="en-US" sz="1600" dirty="0" err="1">
+                <a:solidFill>
+                  <a:srgbClr val="0000FF"/>
+                </a:solidFill>
+                <a:highlight>
+                  <a:srgbClr val="FFFFFF"/>
+                </a:highlight>
+                <a:latin typeface="Consolas" panose="020B0609020204030204" pitchFamily="49" charset="0"/>
+                <a:ea typeface="Calibri" panose="020F0502020204030204" pitchFamily="34" charset="0"/>
+                <a:cs typeface="Times New Roman" panose="02020603050405020304" pitchFamily="18" charset="0"/>
+              </a:rPr>
+              <a:t>nameof</a:t>
+            </a:r>
+            <a:r>
+              <a:rPr lang="en-US" sz="1600" dirty="0">
+                <a:solidFill>
+                  <a:srgbClr val="000000"/>
+                </a:solidFill>
+                <a:highlight>
+                  <a:srgbClr val="FFFFFF"/>
+                </a:highlight>
+                <a:latin typeface="Consolas" panose="020B0609020204030204" pitchFamily="49" charset="0"/>
+                <a:ea typeface="Calibri" panose="020F0502020204030204" pitchFamily="34" charset="0"/>
+                <a:cs typeface="Times New Roman" panose="02020603050405020304" pitchFamily="18" charset="0"/>
+              </a:rPr>
+              <a:t>(name), </a:t>
+            </a:r>
+            <a:endParaRPr lang="en-US" sz="1600" dirty="0">
+              <a:latin typeface="Calibri" panose="020F0502020204030204" pitchFamily="34" charset="0"/>
+              <a:ea typeface="Calibri" panose="020F0502020204030204" pitchFamily="34" charset="0"/>
+              <a:cs typeface="Times New Roman" panose="02020603050405020304" pitchFamily="18" charset="0"/>
+            </a:endParaRPr>
+          </a:p>
+          <a:p>
+            <a:pPr marL="0" marR="0">
+              <a:lnSpc>
+                <a:spcPct val="107000"/>
+              </a:lnSpc>
+              <a:spcBef>
+                <a:spcPts val="0"/>
+              </a:spcBef>
+              <a:spcAft>
+                <a:spcPts val="0"/>
+              </a:spcAft>
+            </a:pPr>
+            <a:r>
+              <a:rPr lang="en-US" sz="1600" dirty="0">
+                <a:solidFill>
+                  <a:srgbClr val="000000"/>
+                </a:solidFill>
+                <a:highlight>
+                  <a:srgbClr val="FFFFFF"/>
+                </a:highlight>
+                <a:latin typeface="Consolas" panose="020B0609020204030204" pitchFamily="49" charset="0"/>
+                <a:ea typeface="Calibri" panose="020F0502020204030204" pitchFamily="34" charset="0"/>
+                <a:cs typeface="Times New Roman" panose="02020603050405020304" pitchFamily="18" charset="0"/>
+              </a:rPr>
+              <a:t>        </a:t>
+            </a:r>
+            <a:r>
+              <a:rPr lang="en-US" sz="1600" dirty="0">
+                <a:solidFill>
+                  <a:srgbClr val="A31515"/>
+                </a:solidFill>
+                <a:highlight>
+                  <a:srgbClr val="FFFFFF"/>
+                </a:highlight>
+                <a:latin typeface="Consolas" panose="020B0609020204030204" pitchFamily="49" charset="0"/>
+                <a:ea typeface="Calibri" panose="020F0502020204030204" pitchFamily="34" charset="0"/>
+                <a:cs typeface="Times New Roman" panose="02020603050405020304" pitchFamily="18" charset="0"/>
+              </a:rPr>
+              <a:t>"The Evil Genius must have a non-blank name"</a:t>
+            </a:r>
+            <a:r>
+              <a:rPr lang="en-US" sz="1600" dirty="0">
+                <a:solidFill>
+                  <a:srgbClr val="000000"/>
+                </a:solidFill>
+                <a:highlight>
+                  <a:srgbClr val="FFFFFF"/>
+                </a:highlight>
+                <a:latin typeface="Consolas" panose="020B0609020204030204" pitchFamily="49" charset="0"/>
+                <a:ea typeface="Calibri" panose="020F0502020204030204" pitchFamily="34" charset="0"/>
+                <a:cs typeface="Times New Roman" panose="02020603050405020304" pitchFamily="18" charset="0"/>
+              </a:rPr>
+              <a:t>);</a:t>
+            </a:r>
+            <a:endParaRPr lang="en-US" sz="1600" dirty="0">
+              <a:latin typeface="Calibri" panose="020F0502020204030204" pitchFamily="34" charset="0"/>
+              <a:ea typeface="Calibri" panose="020F0502020204030204" pitchFamily="34" charset="0"/>
+              <a:cs typeface="Times New Roman" panose="02020603050405020304" pitchFamily="18" charset="0"/>
+            </a:endParaRPr>
+          </a:p>
+          <a:p>
+            <a:pPr marL="0" marR="0">
+              <a:lnSpc>
+                <a:spcPct val="107000"/>
+              </a:lnSpc>
+              <a:spcBef>
+                <a:spcPts val="0"/>
+              </a:spcBef>
+              <a:spcAft>
+                <a:spcPts val="800"/>
+              </a:spcAft>
+            </a:pPr>
+            <a:r>
+              <a:rPr lang="en-US" sz="1600" dirty="0">
+                <a:latin typeface="Calibri" panose="020F0502020204030204" pitchFamily="34" charset="0"/>
+                <a:ea typeface="Calibri" panose="020F0502020204030204" pitchFamily="34" charset="0"/>
+                <a:cs typeface="Times New Roman" panose="02020603050405020304" pitchFamily="18" charset="0"/>
+              </a:rPr>
+              <a:t> </a:t>
+            </a:r>
+            <a:endParaRPr lang="en-US" sz="1600" dirty="0">
+              <a:effectLst/>
+              <a:latin typeface="Calibri" panose="020F0502020204030204" pitchFamily="34" charset="0"/>
+              <a:ea typeface="Calibri" panose="020F0502020204030204" pitchFamily="34" charset="0"/>
+              <a:cs typeface="Times New Roman" panose="02020603050405020304" pitchFamily="18" charset="0"/>
+            </a:endParaRPr>
+          </a:p>
+        </p:txBody>
+      </p:sp>
     </p:spTree>
     <p:extLst>
       <p:ext uri="{BB962C8B-B14F-4D97-AF65-F5344CB8AC3E}">
@@ -6602,6 +7436,59 @@
                       </p:childTnLst>
                     </p:cTn>
                   </p:par>
+                  <p:par>
+                    <p:cTn id="8" fill="hold">
+                      <p:stCondLst>
+                        <p:cond delay="indefinite"/>
+                      </p:stCondLst>
+                      <p:childTnLst>
+                        <p:par>
+                          <p:cTn id="9" fill="hold">
+                            <p:stCondLst>
+                              <p:cond delay="0"/>
+                            </p:stCondLst>
+                            <p:childTnLst>
+                              <p:par>
+                                <p:cTn id="10" presetID="10" presetClass="entr" presetSubtype="0" fill="hold" grpId="0" nodeType="clickEffect">
+                                  <p:stCondLst>
+                                    <p:cond delay="0"/>
+                                  </p:stCondLst>
+                                  <p:childTnLst>
+                                    <p:set>
+                                      <p:cBhvr>
+                                        <p:cTn id="11" dur="1" fill="hold">
+                                          <p:stCondLst>
+                                            <p:cond delay="0"/>
+                                          </p:stCondLst>
+                                        </p:cTn>
+                                        <p:tgtEl>
+                                          <p:spTgt spid="7"/>
+                                        </p:tgtEl>
+                                        <p:attrNameLst>
+                                          <p:attrName>style.visibility</p:attrName>
+                                        </p:attrNameLst>
+                                      </p:cBhvr>
+                                      <p:to>
+                                        <p:strVal val="visible"/>
+                                      </p:to>
+                                    </p:set>
+                                    <p:animEffect transition="in" filter="fade">
+                                      <p:cBhvr>
+                                        <p:cTn id="12" dur="500"/>
+                                        <p:tgtEl>
+                                          <p:spTgt spid="7"/>
+                                        </p:tgtEl>
+                                      </p:cBhvr>
+                                    </p:animEffect>
+                                  </p:childTnLst>
+                                </p:cTn>
+                              </p:par>
+                            </p:childTnLst>
+                          </p:cTn>
+                        </p:par>
+                      </p:childTnLst>
+                    </p:cTn>
+                  </p:par>
                 </p:childTnLst>
               </p:cTn>
               <p:prevCondLst>
@@ -6625,6 +7512,7 @@
     </p:tnLst>
     <p:bldLst>
       <p:bldP spid="6" grpId="0"/>
+      <p:bldP spid="7" grpId="0"/>
     </p:bldLst>
   </p:timing>
 </p:sld>
@@ -7644,24 +8532,6 @@
 </file>
 
 <file path=customXml/item2.xml><?xml version="1.0" encoding="utf-8"?>
-<p:properties xmlns:p="http://schemas.microsoft.com/office/2006/metadata/properties" xmlns:xsi="http://www.w3.org/2001/XMLSchema-instance" xmlns:pc="http://schemas.microsoft.com/office/infopath/2007/PartnerControls">
-  <documentManagement>
-    <TaxCatchAll xmlns="230e9df3-be65-4c73-a93b-d1236ebd677e"/>
-    <PublishingExpirationDate xmlns="http://schemas.microsoft.com/sharepoint/v3" xsi:nil="true"/>
-    <PublishingStartDate xmlns="http://schemas.microsoft.com/sharepoint/v3" xsi:nil="true"/>
-    <TaxKeywordTaxHTField xmlns="230e9df3-be65-4c73-a93b-d1236ebd677e">
-      <Terms xmlns="http://schemas.microsoft.com/office/infopath/2007/PartnerControls">
-        <TermInfo xmlns="http://schemas.microsoft.com/office/infopath/2007/PartnerControls">
-          <TermName xmlns="http://schemas.microsoft.com/office/infopath/2007/PartnerControls">&lt;Any Related Keywords&gt;</TermName>
-          <TermId xmlns="http://schemas.microsoft.com/office/infopath/2007/PartnerControls">11111111-1111-1111-1111-111111111111</TermId>
-        </TermInfo>
-      </Terms>
-    </TaxKeywordTaxHTField>
-  </documentManagement>
-</p:properties>
-</file>
-
-<file path=customXml/item3.xml><?xml version="1.0" encoding="utf-8"?>
 <ct:contentTypeSchema xmlns:ct="http://schemas.microsoft.com/office/2006/metadata/contentType" xmlns:ma="http://schemas.microsoft.com/office/2006/metadata/properties/metaAttributes" ct:_="" ma:_="" ma:contentTypeName="Document" ma:contentTypeID="0x010100496889825850D44592AC5D2F43187AE4" ma:contentTypeVersion="5" ma:contentTypeDescription="Create a new document." ma:contentTypeScope="" ma:versionID="2e43eb919f408cd810abfc945a86e7c8">
   <xsd:schema xmlns:xsd="http://www.w3.org/2001/XMLSchema" xmlns:xs="http://www.w3.org/2001/XMLSchema" xmlns:p="http://schemas.microsoft.com/office/2006/metadata/properties" xmlns:ns1="http://schemas.microsoft.com/sharepoint/v3" xmlns:ns2="230e9df3-be65-4c73-a93b-d1236ebd677e" xmlns:ns3="27aa9422-7f1f-4c84-9cdf-302b1a67e513" targetNamespace="http://schemas.microsoft.com/office/2006/metadata/properties" ma:root="true" ma:fieldsID="3b003b013a7c5b8f8e3d494956829bef" ns1:_="" ns2:_="" ns3:_="">
     <xsd:import namespace="http://schemas.microsoft.com/sharepoint/v3"/>
@@ -7843,6 +8713,24 @@
 </ct:contentTypeSchema>
 </file>
 
+<file path=customXml/item3.xml><?xml version="1.0" encoding="utf-8"?>
+<p:properties xmlns:p="http://schemas.microsoft.com/office/2006/metadata/properties" xmlns:xsi="http://www.w3.org/2001/XMLSchema-instance" xmlns:pc="http://schemas.microsoft.com/office/infopath/2007/PartnerControls">
+  <documentManagement>
+    <TaxCatchAll xmlns="230e9df3-be65-4c73-a93b-d1236ebd677e"/>
+    <PublishingExpirationDate xmlns="http://schemas.microsoft.com/sharepoint/v3" xsi:nil="true"/>
+    <PublishingStartDate xmlns="http://schemas.microsoft.com/sharepoint/v3" xsi:nil="true"/>
+    <TaxKeywordTaxHTField xmlns="230e9df3-be65-4c73-a93b-d1236ebd677e">
+      <Terms xmlns="http://schemas.microsoft.com/office/infopath/2007/PartnerControls">
+        <TermInfo xmlns="http://schemas.microsoft.com/office/infopath/2007/PartnerControls">
+          <TermName xmlns="http://schemas.microsoft.com/office/infopath/2007/PartnerControls">&lt;Any Related Keywords&gt;</TermName>
+          <TermId xmlns="http://schemas.microsoft.com/office/infopath/2007/PartnerControls">11111111-1111-1111-1111-111111111111</TermId>
+        </TermInfo>
+      </Terms>
+    </TaxKeywordTaxHTField>
+  </documentManagement>
+</p:properties>
+</file>
+
 <file path=customXml/itemProps1.xml><?xml version="1.0" encoding="utf-8"?>
 <ds:datastoreItem xmlns:ds="http://schemas.openxmlformats.org/officeDocument/2006/customXml" ds:itemID="{758FDAC0-319D-4A54-8D8E-1D42CB1F8004}">
   <ds:schemaRefs>
@@ -7852,24 +8740,6 @@
 </file>
 
 <file path=customXml/itemProps2.xml><?xml version="1.0" encoding="utf-8"?>
-<ds:datastoreItem xmlns:ds="http://schemas.openxmlformats.org/officeDocument/2006/customXml" ds:itemID="{F990F116-B58F-4255-B05B-DA3808E0E5C6}">
-  <ds:schemaRefs>
-    <ds:schemaRef ds:uri="http://schemas.microsoft.com/office/2006/documentManagement/types"/>
-    <ds:schemaRef ds:uri="http://purl.org/dc/terms/"/>
-    <ds:schemaRef ds:uri="http://purl.org/dc/dcmitype/"/>
-    <ds:schemaRef ds:uri="http://purl.org/dc/elements/1.1/"/>
-    <ds:schemaRef ds:uri="http://schemas.microsoft.com/office/2006/metadata/properties"/>
-    <ds:schemaRef ds:uri="http://schemas.microsoft.com/sharepoint/v3"/>
-    <ds:schemaRef ds:uri="230e9df3-be65-4c73-a93b-d1236ebd677e"/>
-    <ds:schemaRef ds:uri="http://schemas.microsoft.com/office/infopath/2007/PartnerControls"/>
-    <ds:schemaRef ds:uri="http://www.w3.org/XML/1998/namespace"/>
-    <ds:schemaRef ds:uri="http://schemas.openxmlformats.org/package/2006/metadata/core-properties"/>
-    <ds:schemaRef ds:uri="27aa9422-7f1f-4c84-9cdf-302b1a67e513"/>
-  </ds:schemaRefs>
-</ds:datastoreItem>
-</file>
-
-<file path=customXml/itemProps3.xml><?xml version="1.0" encoding="utf-8"?>
 <ds:datastoreItem xmlns:ds="http://schemas.openxmlformats.org/officeDocument/2006/customXml" ds:itemID="{8279456A-742D-4736-95C0-19A1E0B853B2}">
   <ds:schemaRefs>
     <ds:schemaRef ds:uri="http://schemas.microsoft.com/office/2006/metadata/contentType"/>
@@ -7887,4 +8757,22 @@
     <ds:schemaRef ds:uri="http://schemas.microsoft.com/internal/obd"/>
   </ds:schemaRefs>
 </ds:datastoreItem>
+</file>
+
+<file path=customXml/itemProps3.xml><?xml version="1.0" encoding="utf-8"?>
+<ds:datastoreItem xmlns:ds="http://schemas.openxmlformats.org/officeDocument/2006/customXml" ds:itemID="{F990F116-B58F-4255-B05B-DA3808E0E5C6}">
+  <ds:schemaRefs>
+    <ds:schemaRef ds:uri="http://schemas.microsoft.com/office/2006/documentManagement/types"/>
+    <ds:schemaRef ds:uri="http://purl.org/dc/terms/"/>
+    <ds:schemaRef ds:uri="http://purl.org/dc/dcmitype/"/>
+    <ds:schemaRef ds:uri="http://purl.org/dc/elements/1.1/"/>
+    <ds:schemaRef ds:uri="http://schemas.microsoft.com/office/2006/metadata/properties"/>
+    <ds:schemaRef ds:uri="http://schemas.microsoft.com/sharepoint/v3"/>
+    <ds:schemaRef ds:uri="230e9df3-be65-4c73-a93b-d1236ebd677e"/>
+    <ds:schemaRef ds:uri="http://schemas.microsoft.com/office/infopath/2007/PartnerControls"/>
+    <ds:schemaRef ds:uri="http://www.w3.org/XML/1998/namespace"/>
+    <ds:schemaRef ds:uri="http://schemas.openxmlformats.org/package/2006/metadata/core-properties"/>
+    <ds:schemaRef ds:uri="27aa9422-7f1f-4c84-9cdf-302b1a67e513"/>
+  </ds:schemaRefs>
+</ds:datastoreItem>
 </file>
</xml_diff>